<commit_message>
Misc chgs after presentation
</commit_message>
<xml_diff>
--- a/hystrix-demo/demo-slides.pptx
+++ b/hystrix-demo/demo-slides.pptx
@@ -5,7 +5,7 @@
     <p:sldMasterId id="2147483648" r:id="rId1"/>
   </p:sldMasterIdLst>
   <p:notesMasterIdLst>
-    <p:notesMasterId r:id="rId10"/>
+    <p:notesMasterId r:id="rId11"/>
   </p:notesMasterIdLst>
   <p:sldIdLst>
     <p:sldId id="257" r:id="rId2"/>
@@ -16,6 +16,7 @@
     <p:sldId id="264" r:id="rId7"/>
     <p:sldId id="265" r:id="rId8"/>
     <p:sldId id="266" r:id="rId9"/>
+    <p:sldId id="267" r:id="rId10"/>
   </p:sldIdLst>
   <p:sldSz cx="9144000" cy="6858000" type="screen4x3"/>
   <p:notesSz cx="6858000" cy="9144000"/>
@@ -215,7 +216,7 @@
           <a:p>
             <a:fld id="{EC8A2BE7-7790-4473-ACA7-2E7D92BE81C7}" type="datetimeFigureOut">
               <a:rPr lang="en-US" smtClean="0"/>
-              <a:t>11/7/16</a:t>
+              <a:t>11/8/16</a:t>
             </a:fld>
             <a:endParaRPr lang="en-US"/>
           </a:p>
@@ -484,6 +485,587 @@
 </file>
 
 <file path=ppt/notesSlides/notesSlide1.xml><?xml version="1.0" encoding="utf-8"?>
+<p:notes xmlns:a="http://schemas.openxmlformats.org/drawingml/2006/main" xmlns:r="http://schemas.openxmlformats.org/officeDocument/2006/relationships" xmlns:p="http://schemas.openxmlformats.org/presentationml/2006/main">
+  <p:cSld>
+    <p:spTree>
+      <p:nvGrpSpPr>
+        <p:cNvPr id="1" name=""/>
+        <p:cNvGrpSpPr/>
+        <p:nvPr/>
+      </p:nvGrpSpPr>
+      <p:grpSpPr>
+        <a:xfrm>
+          <a:off x="0" y="0"/>
+          <a:ext cx="0" cy="0"/>
+          <a:chOff x="0" y="0"/>
+          <a:chExt cx="0" cy="0"/>
+        </a:xfrm>
+      </p:grpSpPr>
+      <p:sp>
+        <p:nvSpPr>
+          <p:cNvPr id="2" name="Slide Image Placeholder 1"/>
+          <p:cNvSpPr>
+            <a:spLocks noGrp="1" noRot="1" noChangeAspect="1"/>
+          </p:cNvSpPr>
+          <p:nvPr>
+            <p:ph type="sldImg"/>
+          </p:nvPr>
+        </p:nvSpPr>
+        <p:spPr/>
+      </p:sp>
+      <p:sp>
+        <p:nvSpPr>
+          <p:cNvPr id="3" name="Notes Placeholder 2"/>
+          <p:cNvSpPr>
+            <a:spLocks noGrp="1"/>
+          </p:cNvSpPr>
+          <p:nvPr>
+            <p:ph type="body" idx="1"/>
+          </p:nvPr>
+        </p:nvSpPr>
+        <p:spPr/>
+        <p:txBody>
+          <a:bodyPr/>
+          <a:lstStyle/>
+          <a:p>
+            <a:endParaRPr lang="en-US" dirty="0"/>
+          </a:p>
+        </p:txBody>
+      </p:sp>
+      <p:sp>
+        <p:nvSpPr>
+          <p:cNvPr id="4" name="Slide Number Placeholder 3"/>
+          <p:cNvSpPr>
+            <a:spLocks noGrp="1"/>
+          </p:cNvSpPr>
+          <p:nvPr>
+            <p:ph type="sldNum" sz="quarter" idx="10"/>
+          </p:nvPr>
+        </p:nvSpPr>
+        <p:spPr/>
+        <p:txBody>
+          <a:bodyPr/>
+          <a:lstStyle/>
+          <a:p>
+            <a:fld id="{CDFF7155-4804-4F1C-B784-85EC3599DB14}" type="slidenum">
+              <a:rPr lang="en-US" smtClean="0"/>
+              <a:t>1</a:t>
+            </a:fld>
+            <a:endParaRPr lang="en-US"/>
+          </a:p>
+        </p:txBody>
+      </p:sp>
+    </p:spTree>
+    <p:extLst>
+      <p:ext uri="{BB962C8B-B14F-4D97-AF65-F5344CB8AC3E}">
+        <p14:creationId xmlns:p14="http://schemas.microsoft.com/office/powerpoint/2010/main" val="1897956172"/>
+      </p:ext>
+    </p:extLst>
+  </p:cSld>
+  <p:clrMapOvr>
+    <a:masterClrMapping/>
+  </p:clrMapOvr>
+</p:notes>
+</file>
+
+<file path=ppt/notesSlides/notesSlide2.xml><?xml version="1.0" encoding="utf-8"?>
+<p:notes xmlns:a="http://schemas.openxmlformats.org/drawingml/2006/main" xmlns:r="http://schemas.openxmlformats.org/officeDocument/2006/relationships" xmlns:p="http://schemas.openxmlformats.org/presentationml/2006/main">
+  <p:cSld>
+    <p:spTree>
+      <p:nvGrpSpPr>
+        <p:cNvPr id="1" name=""/>
+        <p:cNvGrpSpPr/>
+        <p:nvPr/>
+      </p:nvGrpSpPr>
+      <p:grpSpPr>
+        <a:xfrm>
+          <a:off x="0" y="0"/>
+          <a:ext cx="0" cy="0"/>
+          <a:chOff x="0" y="0"/>
+          <a:chExt cx="0" cy="0"/>
+        </a:xfrm>
+      </p:grpSpPr>
+      <p:sp>
+        <p:nvSpPr>
+          <p:cNvPr id="2" name="Slide Image Placeholder 1"/>
+          <p:cNvSpPr>
+            <a:spLocks noGrp="1" noRot="1" noChangeAspect="1"/>
+          </p:cNvSpPr>
+          <p:nvPr>
+            <p:ph type="sldImg"/>
+          </p:nvPr>
+        </p:nvSpPr>
+        <p:spPr/>
+      </p:sp>
+      <p:sp>
+        <p:nvSpPr>
+          <p:cNvPr id="3" name="Notes Placeholder 2"/>
+          <p:cNvSpPr>
+            <a:spLocks noGrp="1"/>
+          </p:cNvSpPr>
+          <p:nvPr>
+            <p:ph type="body" idx="1"/>
+          </p:nvPr>
+        </p:nvSpPr>
+        <p:spPr/>
+        <p:txBody>
+          <a:bodyPr/>
+          <a:lstStyle/>
+          <a:p>
+            <a:r>
+              <a:rPr lang="en-US" dirty="0" smtClean="0"/>
+              <a:t>Demo</a:t>
+            </a:r>
+            <a:r>
+              <a:rPr lang="en-US" baseline="0" dirty="0" smtClean="0"/>
+              <a:t> project you can tinker in</a:t>
+            </a:r>
+            <a:endParaRPr lang="en-US" dirty="0"/>
+          </a:p>
+        </p:txBody>
+      </p:sp>
+      <p:sp>
+        <p:nvSpPr>
+          <p:cNvPr id="4" name="Slide Number Placeholder 3"/>
+          <p:cNvSpPr>
+            <a:spLocks noGrp="1"/>
+          </p:cNvSpPr>
+          <p:nvPr>
+            <p:ph type="sldNum" sz="quarter" idx="10"/>
+          </p:nvPr>
+        </p:nvSpPr>
+        <p:spPr/>
+        <p:txBody>
+          <a:bodyPr/>
+          <a:lstStyle/>
+          <a:p>
+            <a:fld id="{CDFF7155-4804-4F1C-B784-85EC3599DB14}" type="slidenum">
+              <a:rPr lang="en-US" smtClean="0"/>
+              <a:t>2</a:t>
+            </a:fld>
+            <a:endParaRPr lang="en-US"/>
+          </a:p>
+        </p:txBody>
+      </p:sp>
+    </p:spTree>
+    <p:extLst>
+      <p:ext uri="{BB962C8B-B14F-4D97-AF65-F5344CB8AC3E}">
+        <p14:creationId xmlns:p14="http://schemas.microsoft.com/office/powerpoint/2010/main" val="1018956268"/>
+      </p:ext>
+    </p:extLst>
+  </p:cSld>
+  <p:clrMapOvr>
+    <a:masterClrMapping/>
+  </p:clrMapOvr>
+</p:notes>
+</file>
+
+<file path=ppt/notesSlides/notesSlide3.xml><?xml version="1.0" encoding="utf-8"?>
+<p:notes xmlns:a="http://schemas.openxmlformats.org/drawingml/2006/main" xmlns:r="http://schemas.openxmlformats.org/officeDocument/2006/relationships" xmlns:p="http://schemas.openxmlformats.org/presentationml/2006/main">
+  <p:cSld>
+    <p:spTree>
+      <p:nvGrpSpPr>
+        <p:cNvPr id="1" name=""/>
+        <p:cNvGrpSpPr/>
+        <p:nvPr/>
+      </p:nvGrpSpPr>
+      <p:grpSpPr>
+        <a:xfrm>
+          <a:off x="0" y="0"/>
+          <a:ext cx="0" cy="0"/>
+          <a:chOff x="0" y="0"/>
+          <a:chExt cx="0" cy="0"/>
+        </a:xfrm>
+      </p:grpSpPr>
+      <p:sp>
+        <p:nvSpPr>
+          <p:cNvPr id="2" name="Slide Image Placeholder 1"/>
+          <p:cNvSpPr>
+            <a:spLocks noGrp="1" noRot="1" noChangeAspect="1"/>
+          </p:cNvSpPr>
+          <p:nvPr>
+            <p:ph type="sldImg"/>
+          </p:nvPr>
+        </p:nvSpPr>
+        <p:spPr/>
+      </p:sp>
+      <p:sp>
+        <p:nvSpPr>
+          <p:cNvPr id="3" name="Notes Placeholder 2"/>
+          <p:cNvSpPr>
+            <a:spLocks noGrp="1"/>
+          </p:cNvSpPr>
+          <p:nvPr>
+            <p:ph type="body" idx="1"/>
+          </p:nvPr>
+        </p:nvSpPr>
+        <p:spPr/>
+        <p:txBody>
+          <a:bodyPr/>
+          <a:lstStyle/>
+          <a:p>
+            <a:r>
+              <a:rPr lang="en-US" dirty="0" smtClean="0"/>
+              <a:t>Resilience, fault-tolerance distributed system</a:t>
+            </a:r>
+          </a:p>
+          <a:p>
+            <a:r>
+              <a:rPr lang="en-US" dirty="0" smtClean="0"/>
+              <a:t>Defense,</a:t>
+            </a:r>
+            <a:r>
+              <a:rPr lang="en-US" baseline="0" dirty="0" smtClean="0"/>
+              <a:t> protection, isolation</a:t>
+            </a:r>
+          </a:p>
+          <a:p>
+            <a:r>
+              <a:rPr lang="en-US" baseline="0" dirty="0" smtClean="0"/>
+              <a:t>Parallel to electronics circuit</a:t>
+            </a:r>
+          </a:p>
+          <a:p>
+            <a:r>
+              <a:rPr lang="en-US" baseline="0" dirty="0" smtClean="0"/>
+              <a:t>“Bulkhead”</a:t>
+            </a:r>
+            <a:endParaRPr lang="en-US" dirty="0"/>
+          </a:p>
+        </p:txBody>
+      </p:sp>
+      <p:sp>
+        <p:nvSpPr>
+          <p:cNvPr id="4" name="Slide Number Placeholder 3"/>
+          <p:cNvSpPr>
+            <a:spLocks noGrp="1"/>
+          </p:cNvSpPr>
+          <p:nvPr>
+            <p:ph type="sldNum" sz="quarter" idx="10"/>
+          </p:nvPr>
+        </p:nvSpPr>
+        <p:spPr/>
+        <p:txBody>
+          <a:bodyPr/>
+          <a:lstStyle/>
+          <a:p>
+            <a:fld id="{CDFF7155-4804-4F1C-B784-85EC3599DB14}" type="slidenum">
+              <a:rPr lang="en-US" smtClean="0"/>
+              <a:t>3</a:t>
+            </a:fld>
+            <a:endParaRPr lang="en-US"/>
+          </a:p>
+        </p:txBody>
+      </p:sp>
+    </p:spTree>
+    <p:extLst>
+      <p:ext uri="{BB962C8B-B14F-4D97-AF65-F5344CB8AC3E}">
+        <p14:creationId xmlns:p14="http://schemas.microsoft.com/office/powerpoint/2010/main" val="227290266"/>
+      </p:ext>
+    </p:extLst>
+  </p:cSld>
+  <p:clrMapOvr>
+    <a:masterClrMapping/>
+  </p:clrMapOvr>
+</p:notes>
+</file>
+
+<file path=ppt/notesSlides/notesSlide4.xml><?xml version="1.0" encoding="utf-8"?>
+<p:notes xmlns:a="http://schemas.openxmlformats.org/drawingml/2006/main" xmlns:r="http://schemas.openxmlformats.org/officeDocument/2006/relationships" xmlns:p="http://schemas.openxmlformats.org/presentationml/2006/main">
+  <p:cSld>
+    <p:spTree>
+      <p:nvGrpSpPr>
+        <p:cNvPr id="1" name=""/>
+        <p:cNvGrpSpPr/>
+        <p:nvPr/>
+      </p:nvGrpSpPr>
+      <p:grpSpPr>
+        <a:xfrm>
+          <a:off x="0" y="0"/>
+          <a:ext cx="0" cy="0"/>
+          <a:chOff x="0" y="0"/>
+          <a:chExt cx="0" cy="0"/>
+        </a:xfrm>
+      </p:grpSpPr>
+      <p:sp>
+        <p:nvSpPr>
+          <p:cNvPr id="2" name="Slide Image Placeholder 1"/>
+          <p:cNvSpPr>
+            <a:spLocks noGrp="1" noRot="1" noChangeAspect="1"/>
+          </p:cNvSpPr>
+          <p:nvPr>
+            <p:ph type="sldImg"/>
+          </p:nvPr>
+        </p:nvSpPr>
+        <p:spPr/>
+      </p:sp>
+      <p:sp>
+        <p:nvSpPr>
+          <p:cNvPr id="3" name="Notes Placeholder 2"/>
+          <p:cNvSpPr>
+            <a:spLocks noGrp="1"/>
+          </p:cNvSpPr>
+          <p:nvPr>
+            <p:ph type="body" idx="1"/>
+          </p:nvPr>
+        </p:nvSpPr>
+        <p:spPr/>
+        <p:txBody>
+          <a:bodyPr/>
+          <a:lstStyle/>
+          <a:p>
+            <a:r>
+              <a:rPr lang="en-US" dirty="0" smtClean="0"/>
+              <a:t>Command Pattern</a:t>
+            </a:r>
+          </a:p>
+          <a:p>
+            <a:r>
+              <a:rPr lang="en-US" dirty="0" smtClean="0"/>
+              <a:t>Overhead:  </a:t>
+            </a:r>
+            <a:r>
+              <a:rPr lang="en-US" dirty="0" err="1" smtClean="0"/>
+              <a:t>obj</a:t>
+            </a:r>
+            <a:r>
+              <a:rPr lang="en-US" dirty="0" smtClean="0"/>
+              <a:t> allocation, thread execution</a:t>
+            </a:r>
+          </a:p>
+          <a:p>
+            <a:r>
+              <a:rPr lang="en-US" dirty="0" smtClean="0"/>
+              <a:t>Variation</a:t>
+            </a:r>
+            <a:r>
+              <a:rPr lang="en-US" baseline="0" dirty="0" smtClean="0"/>
+              <a:t>s:  asynchronous with Observer</a:t>
+            </a:r>
+            <a:endParaRPr lang="en-US" dirty="0"/>
+          </a:p>
+        </p:txBody>
+      </p:sp>
+      <p:sp>
+        <p:nvSpPr>
+          <p:cNvPr id="4" name="Slide Number Placeholder 3"/>
+          <p:cNvSpPr>
+            <a:spLocks noGrp="1"/>
+          </p:cNvSpPr>
+          <p:nvPr>
+            <p:ph type="sldNum" sz="quarter" idx="10"/>
+          </p:nvPr>
+        </p:nvSpPr>
+        <p:spPr/>
+        <p:txBody>
+          <a:bodyPr/>
+          <a:lstStyle/>
+          <a:p>
+            <a:fld id="{CDFF7155-4804-4F1C-B784-85EC3599DB14}" type="slidenum">
+              <a:rPr lang="en-US" smtClean="0"/>
+              <a:t>5</a:t>
+            </a:fld>
+            <a:endParaRPr lang="en-US"/>
+          </a:p>
+        </p:txBody>
+      </p:sp>
+    </p:spTree>
+    <p:extLst>
+      <p:ext uri="{BB962C8B-B14F-4D97-AF65-F5344CB8AC3E}">
+        <p14:creationId xmlns:p14="http://schemas.microsoft.com/office/powerpoint/2010/main" val="70120848"/>
+      </p:ext>
+    </p:extLst>
+  </p:cSld>
+  <p:clrMapOvr>
+    <a:masterClrMapping/>
+  </p:clrMapOvr>
+</p:notes>
+</file>
+
+<file path=ppt/notesSlides/notesSlide5.xml><?xml version="1.0" encoding="utf-8"?>
+<p:notes xmlns:a="http://schemas.openxmlformats.org/drawingml/2006/main" xmlns:r="http://schemas.openxmlformats.org/officeDocument/2006/relationships" xmlns:p="http://schemas.openxmlformats.org/presentationml/2006/main">
+  <p:cSld>
+    <p:spTree>
+      <p:nvGrpSpPr>
+        <p:cNvPr id="1" name=""/>
+        <p:cNvGrpSpPr/>
+        <p:nvPr/>
+      </p:nvGrpSpPr>
+      <p:grpSpPr>
+        <a:xfrm>
+          <a:off x="0" y="0"/>
+          <a:ext cx="0" cy="0"/>
+          <a:chOff x="0" y="0"/>
+          <a:chExt cx="0" cy="0"/>
+        </a:xfrm>
+      </p:grpSpPr>
+      <p:sp>
+        <p:nvSpPr>
+          <p:cNvPr id="2" name="Slide Image Placeholder 1"/>
+          <p:cNvSpPr>
+            <a:spLocks noGrp="1" noRot="1" noChangeAspect="1"/>
+          </p:cNvSpPr>
+          <p:nvPr>
+            <p:ph type="sldImg"/>
+          </p:nvPr>
+        </p:nvSpPr>
+        <p:spPr/>
+      </p:sp>
+      <p:sp>
+        <p:nvSpPr>
+          <p:cNvPr id="3" name="Notes Placeholder 2"/>
+          <p:cNvSpPr>
+            <a:spLocks noGrp="1"/>
+          </p:cNvSpPr>
+          <p:nvPr>
+            <p:ph type="body" idx="1"/>
+          </p:nvPr>
+        </p:nvSpPr>
+        <p:spPr/>
+        <p:txBody>
+          <a:bodyPr/>
+          <a:lstStyle/>
+          <a:p>
+            <a:r>
+              <a:rPr lang="en-US" dirty="0" smtClean="0"/>
+              <a:t>Hello </a:t>
+            </a:r>
+            <a:r>
+              <a:rPr lang="en-US" dirty="0" err="1" smtClean="0"/>
+              <a:t>cmd</a:t>
+            </a:r>
+            <a:r>
+              <a:rPr lang="en-US" dirty="0" smtClean="0"/>
+              <a:t> NOW</a:t>
+            </a:r>
+            <a:endParaRPr lang="en-US" dirty="0"/>
+          </a:p>
+        </p:txBody>
+      </p:sp>
+      <p:sp>
+        <p:nvSpPr>
+          <p:cNvPr id="4" name="Slide Number Placeholder 3"/>
+          <p:cNvSpPr>
+            <a:spLocks noGrp="1"/>
+          </p:cNvSpPr>
+          <p:nvPr>
+            <p:ph type="sldNum" sz="quarter" idx="10"/>
+          </p:nvPr>
+        </p:nvSpPr>
+        <p:spPr/>
+        <p:txBody>
+          <a:bodyPr/>
+          <a:lstStyle/>
+          <a:p>
+            <a:fld id="{CDFF7155-4804-4F1C-B784-85EC3599DB14}" type="slidenum">
+              <a:rPr lang="en-US" smtClean="0"/>
+              <a:t>6</a:t>
+            </a:fld>
+            <a:endParaRPr lang="en-US"/>
+          </a:p>
+        </p:txBody>
+      </p:sp>
+    </p:spTree>
+    <p:extLst>
+      <p:ext uri="{BB962C8B-B14F-4D97-AF65-F5344CB8AC3E}">
+        <p14:creationId xmlns:p14="http://schemas.microsoft.com/office/powerpoint/2010/main" val="1016717760"/>
+      </p:ext>
+    </p:extLst>
+  </p:cSld>
+  <p:clrMapOvr>
+    <a:masterClrMapping/>
+  </p:clrMapOvr>
+</p:notes>
+</file>
+
+<file path=ppt/notesSlides/notesSlide6.xml><?xml version="1.0" encoding="utf-8"?>
+<p:notes xmlns:a="http://schemas.openxmlformats.org/drawingml/2006/main" xmlns:r="http://schemas.openxmlformats.org/officeDocument/2006/relationships" xmlns:p="http://schemas.openxmlformats.org/presentationml/2006/main">
+  <p:cSld>
+    <p:spTree>
+      <p:nvGrpSpPr>
+        <p:cNvPr id="1" name=""/>
+        <p:cNvGrpSpPr/>
+        <p:nvPr/>
+      </p:nvGrpSpPr>
+      <p:grpSpPr>
+        <a:xfrm>
+          <a:off x="0" y="0"/>
+          <a:ext cx="0" cy="0"/>
+          <a:chOff x="0" y="0"/>
+          <a:chExt cx="0" cy="0"/>
+        </a:xfrm>
+      </p:grpSpPr>
+      <p:sp>
+        <p:nvSpPr>
+          <p:cNvPr id="2" name="Slide Image Placeholder 1"/>
+          <p:cNvSpPr>
+            <a:spLocks noGrp="1" noRot="1" noChangeAspect="1"/>
+          </p:cNvSpPr>
+          <p:nvPr>
+            <p:ph type="sldImg"/>
+          </p:nvPr>
+        </p:nvSpPr>
+        <p:spPr/>
+      </p:sp>
+      <p:sp>
+        <p:nvSpPr>
+          <p:cNvPr id="3" name="Notes Placeholder 2"/>
+          <p:cNvSpPr>
+            <a:spLocks noGrp="1"/>
+          </p:cNvSpPr>
+          <p:nvPr>
+            <p:ph type="body" idx="1"/>
+          </p:nvPr>
+        </p:nvSpPr>
+        <p:spPr/>
+        <p:txBody>
+          <a:bodyPr/>
+          <a:lstStyle/>
+          <a:p>
+            <a:pPr marL="228600" indent="-228600">
+              <a:buAutoNum type="arabicParenR"/>
+            </a:pPr>
+            <a:endParaRPr lang="en-US" dirty="0"/>
+          </a:p>
+        </p:txBody>
+      </p:sp>
+      <p:sp>
+        <p:nvSpPr>
+          <p:cNvPr id="4" name="Slide Number Placeholder 3"/>
+          <p:cNvSpPr>
+            <a:spLocks noGrp="1"/>
+          </p:cNvSpPr>
+          <p:nvPr>
+            <p:ph type="sldNum" sz="quarter" idx="10"/>
+          </p:nvPr>
+        </p:nvSpPr>
+        <p:spPr/>
+        <p:txBody>
+          <a:bodyPr/>
+          <a:lstStyle/>
+          <a:p>
+            <a:fld id="{CDFF7155-4804-4F1C-B784-85EC3599DB14}" type="slidenum">
+              <a:rPr lang="en-US" smtClean="0"/>
+              <a:t>7</a:t>
+            </a:fld>
+            <a:endParaRPr lang="en-US"/>
+          </a:p>
+        </p:txBody>
+      </p:sp>
+    </p:spTree>
+    <p:extLst>
+      <p:ext uri="{BB962C8B-B14F-4D97-AF65-F5344CB8AC3E}">
+        <p14:creationId xmlns:p14="http://schemas.microsoft.com/office/powerpoint/2010/main" val="84381962"/>
+      </p:ext>
+    </p:extLst>
+  </p:cSld>
+  <p:clrMapOvr>
+    <a:masterClrMapping/>
+  </p:clrMapOvr>
+</p:notes>
+</file>
+
+<file path=ppt/notesSlides/notesSlide7.xml><?xml version="1.0" encoding="utf-8"?>
 <p:notes xmlns:a="http://schemas.openxmlformats.org/drawingml/2006/main" xmlns:r="http://schemas.openxmlformats.org/officeDocument/2006/relationships" xmlns:p="http://schemas.openxmlformats.org/presentationml/2006/main">
   <p:cSld>
     <p:spTree>
@@ -1626,14 +2208,14 @@
           <p:nvPr/>
         </p:nvPicPr>
         <p:blipFill>
-          <a:blip r:embed="rId2"/>
+          <a:blip r:embed="rId3"/>
           <a:stretch>
             <a:fillRect/>
           </a:stretch>
         </p:blipFill>
         <p:spPr>
           <a:xfrm>
-            <a:off x="304800" y="914400"/>
+            <a:off x="228600" y="-30562"/>
             <a:ext cx="8128000" cy="2298700"/>
           </a:xfrm>
           <a:prstGeom prst="rect">
@@ -1641,6 +2223,83 @@
           </a:prstGeom>
         </p:spPr>
       </p:pic>
+      <p:sp>
+        <p:nvSpPr>
+          <p:cNvPr id="4" name="Rectangle 3"/>
+          <p:cNvSpPr/>
+          <p:nvPr/>
+        </p:nvSpPr>
+        <p:spPr>
+          <a:xfrm>
+            <a:off x="2286000" y="2690336"/>
+            <a:ext cx="4572000" cy="1477328"/>
+          </a:xfrm>
+          <a:prstGeom prst="rect">
+            <a:avLst/>
+          </a:prstGeom>
+        </p:spPr>
+        <p:txBody>
+          <a:bodyPr>
+            <a:spAutoFit/>
+          </a:bodyPr>
+          <a:lstStyle/>
+          <a:p>
+            <a:r>
+              <a:rPr lang="en-US" dirty="0">
+                <a:solidFill>
+                  <a:srgbClr val="4B2477"/>
+                </a:solidFill>
+                <a:latin typeface="Arial" charset="0"/>
+              </a:rPr>
+              <a:t>Programming and Algorithms</a:t>
+            </a:r>
+            <a:endParaRPr lang="en-US" dirty="0"/>
+          </a:p>
+          <a:p>
+            <a:r>
+              <a:rPr lang="en-US" dirty="0" err="1">
+                <a:solidFill>
+                  <a:srgbClr val="4B2477"/>
+                </a:solidFill>
+                <a:latin typeface="Arial" charset="0"/>
+              </a:rPr>
+              <a:t>Cars.com</a:t>
+            </a:r>
+            <a:r>
+              <a:rPr lang="en-US" dirty="0">
+                <a:solidFill>
+                  <a:srgbClr val="4B2477"/>
+                </a:solidFill>
+                <a:latin typeface="Arial" charset="0"/>
+              </a:rPr>
+              <a:t> Tech Tailgate 2016</a:t>
+            </a:r>
+            <a:endParaRPr lang="en-US" dirty="0"/>
+          </a:p>
+          <a:p>
+            <a:r>
+              <a:rPr lang="en-US" dirty="0" smtClean="0">
+                <a:solidFill>
+                  <a:srgbClr val="4B2477"/>
+                </a:solidFill>
+                <a:latin typeface="Arial" charset="0"/>
+              </a:rPr>
+              <a:t>Michael Michalak</a:t>
+            </a:r>
+            <a:endParaRPr lang="en-US" dirty="0"/>
+          </a:p>
+          <a:p>
+            <a:r>
+              <a:rPr lang="en-US" dirty="0"/>
+              <a:t/>
+            </a:r>
+            <a:br>
+              <a:rPr lang="en-US" dirty="0"/>
+            </a:br>
+            <a:endParaRPr lang="en-US" dirty="0"/>
+          </a:p>
+        </p:txBody>
+      </p:sp>
     </p:spTree>
     <p:extLst>
       <p:ext uri="{BB962C8B-B14F-4D97-AF65-F5344CB8AC3E}">
@@ -1738,7 +2397,6 @@
               <a:rPr lang="en-US" dirty="0"/>
               <a:t> Dashboard</a:t>
             </a:r>
-            <a:endParaRPr lang="en-US" dirty="0"/>
           </a:p>
         </p:txBody>
       </p:sp>
@@ -1813,7 +2471,7 @@
           <a:bodyPr/>
           <a:lstStyle/>
           <a:p>
-            <a:endParaRPr lang="en-US"/>
+            <a:endParaRPr lang="en-US" dirty="0"/>
           </a:p>
         </p:txBody>
       </p:sp>
@@ -1826,15 +2484,39 @@
           <p:nvPr/>
         </p:nvPicPr>
         <p:blipFill>
-          <a:blip r:embed="rId2"/>
+          <a:blip r:embed="rId3"/>
           <a:stretch>
             <a:fillRect/>
           </a:stretch>
         </p:blipFill>
         <p:spPr>
           <a:xfrm>
-            <a:off x="825286" y="1809735"/>
-            <a:ext cx="8084626" cy="2800350"/>
+            <a:off x="609600" y="76200"/>
+            <a:ext cx="7398826" cy="2800350"/>
+          </a:xfrm>
+          <a:prstGeom prst="rect">
+            <a:avLst/>
+          </a:prstGeom>
+        </p:spPr>
+      </p:pic>
+      <p:pic>
+        <p:nvPicPr>
+          <p:cNvPr id="5" name="Picture 4"/>
+          <p:cNvPicPr>
+            <a:picLocks noChangeAspect="1"/>
+          </p:cNvPicPr>
+          <p:nvPr/>
+        </p:nvPicPr>
+        <p:blipFill>
+          <a:blip r:embed="rId4"/>
+          <a:stretch>
+            <a:fillRect/>
+          </a:stretch>
+        </p:blipFill>
+        <p:spPr>
+          <a:xfrm>
+            <a:off x="4191000" y="2802363"/>
+            <a:ext cx="3556000" cy="3111500"/>
           </a:xfrm>
           <a:prstGeom prst="rect">
             <a:avLst/>
@@ -2372,35 +3054,6 @@
       </p:sp>
       <p:sp>
         <p:nvSpPr>
-          <p:cNvPr id="5" name="TextBox 4"/>
-          <p:cNvSpPr txBox="1"/>
-          <p:nvPr/>
-        </p:nvSpPr>
-        <p:spPr>
-          <a:xfrm>
-            <a:off x="2836190" y="3471620"/>
-            <a:ext cx="914400" cy="914400"/>
-          </a:xfrm>
-          <a:prstGeom prst="rect">
-            <a:avLst/>
-          </a:prstGeom>
-          <a:noFill/>
-          <a:ln>
-            <a:noFill/>
-          </a:ln>
-        </p:spPr>
-        <p:txBody>
-          <a:bodyPr vert="horz" wrap="none" lIns="91440" tIns="45720" rIns="91440" bIns="45720" rtlCol="0" anchor="ctr">
-            <a:normAutofit/>
-          </a:bodyPr>
-          <a:lstStyle/>
-          <a:p>
-            <a:endParaRPr lang="en-US" dirty="0" smtClean="0"/>
-          </a:p>
-        </p:txBody>
-      </p:sp>
-      <p:sp>
-        <p:nvSpPr>
           <p:cNvPr id="6" name="Rectangle 5"/>
           <p:cNvSpPr/>
           <p:nvPr/>
@@ -2734,6 +3387,36 @@
           </a:p>
         </p:txBody>
       </p:sp>
+      <p:sp>
+        <p:nvSpPr>
+          <p:cNvPr id="13" name="TextBox 12"/>
+          <p:cNvSpPr txBox="1"/>
+          <p:nvPr/>
+        </p:nvSpPr>
+        <p:spPr>
+          <a:xfrm>
+            <a:off x="4238451" y="3623625"/>
+            <a:ext cx="859531" cy="369332"/>
+          </a:xfrm>
+          <a:prstGeom prst="rect">
+            <a:avLst/>
+          </a:prstGeom>
+          <a:noFill/>
+        </p:spPr>
+        <p:txBody>
+          <a:bodyPr wrap="none" rtlCol="0">
+            <a:spAutoFit/>
+          </a:bodyPr>
+          <a:lstStyle/>
+          <a:p>
+            <a:r>
+              <a:rPr lang="en-US" smtClean="0"/>
+              <a:t>“has a”</a:t>
+            </a:r>
+            <a:endParaRPr lang="en-US"/>
+          </a:p>
+        </p:txBody>
+      </p:sp>
     </p:spTree>
     <p:extLst>
       <p:ext uri="{BB962C8B-B14F-4D97-AF65-F5344CB8AC3E}">
@@ -2818,7 +3501,7 @@
           <p:nvPr/>
         </p:nvPicPr>
         <p:blipFill>
-          <a:blip r:embed="rId2"/>
+          <a:blip r:embed="rId3"/>
           <a:stretch>
             <a:fillRect/>
           </a:stretch>
@@ -2917,7 +3600,7 @@
           <p:nvPr/>
         </p:nvPicPr>
         <p:blipFill>
-          <a:blip r:embed="rId2"/>
+          <a:blip r:embed="rId3"/>
           <a:stretch>
             <a:fillRect/>
           </a:stretch>
@@ -3079,6 +3762,97 @@
     <p:extLst>
       <p:ext uri="{BB962C8B-B14F-4D97-AF65-F5344CB8AC3E}">
         <p14:creationId xmlns:p14="http://schemas.microsoft.com/office/powerpoint/2010/main" val="1886575112"/>
+      </p:ext>
+    </p:extLst>
+  </p:cSld>
+  <p:clrMapOvr>
+    <a:masterClrMapping/>
+  </p:clrMapOvr>
+  <p:timing>
+    <p:tnLst>
+      <p:par>
+        <p:cTn id="1" dur="indefinite" restart="never" nodeType="tmRoot"/>
+      </p:par>
+    </p:tnLst>
+  </p:timing>
+</p:sld>
+</file>
+
+<file path=ppt/slides/slide9.xml><?xml version="1.0" encoding="utf-8"?>
+<p:sld xmlns:a="http://schemas.openxmlformats.org/drawingml/2006/main" xmlns:r="http://schemas.openxmlformats.org/officeDocument/2006/relationships" xmlns:p="http://schemas.openxmlformats.org/presentationml/2006/main">
+  <p:cSld>
+    <p:spTree>
+      <p:nvGrpSpPr>
+        <p:cNvPr id="1" name=""/>
+        <p:cNvGrpSpPr/>
+        <p:nvPr/>
+      </p:nvGrpSpPr>
+      <p:grpSpPr>
+        <a:xfrm>
+          <a:off x="0" y="0"/>
+          <a:ext cx="0" cy="0"/>
+          <a:chOff x="0" y="0"/>
+          <a:chExt cx="0" cy="0"/>
+        </a:xfrm>
+      </p:grpSpPr>
+      <p:sp>
+        <p:nvSpPr>
+          <p:cNvPr id="2" name="Title 1"/>
+          <p:cNvSpPr>
+            <a:spLocks noGrp="1"/>
+          </p:cNvSpPr>
+          <p:nvPr>
+            <p:ph type="title"/>
+          </p:nvPr>
+        </p:nvSpPr>
+        <p:spPr/>
+        <p:txBody>
+          <a:bodyPr/>
+          <a:lstStyle/>
+          <a:p>
+            <a:endParaRPr lang="en-US"/>
+          </a:p>
+        </p:txBody>
+      </p:sp>
+      <p:sp>
+        <p:nvSpPr>
+          <p:cNvPr id="3" name="Text Placeholder 2"/>
+          <p:cNvSpPr>
+            <a:spLocks noGrp="1"/>
+          </p:cNvSpPr>
+          <p:nvPr>
+            <p:ph type="body" sz="quarter" idx="10"/>
+          </p:nvPr>
+        </p:nvSpPr>
+        <p:spPr/>
+        <p:txBody>
+          <a:bodyPr/>
+          <a:lstStyle/>
+          <a:p>
+            <a:r>
+              <a:rPr lang="en-US" dirty="0"/>
+              <a:t> https://</a:t>
+            </a:r>
+            <a:r>
+              <a:rPr lang="en-US" dirty="0" err="1"/>
+              <a:t>github.com</a:t>
+            </a:r>
+            <a:r>
+              <a:rPr lang="en-US" dirty="0"/>
+              <a:t>/mmich826/</a:t>
+            </a:r>
+            <a:r>
+              <a:rPr lang="en-US" dirty="0" err="1"/>
+              <a:t>hystrix-demo.git</a:t>
+            </a:r>
+            <a:endParaRPr lang="en-US" dirty="0"/>
+          </a:p>
+        </p:txBody>
+      </p:sp>
+    </p:spTree>
+    <p:extLst>
+      <p:ext uri="{BB962C8B-B14F-4D97-AF65-F5344CB8AC3E}">
+        <p14:creationId xmlns:p14="http://schemas.microsoft.com/office/powerpoint/2010/main" val="1218493110"/>
       </p:ext>
     </p:extLst>
   </p:cSld>

</xml_diff>